<commit_message>
presentation notes, 9 minutes
</commit_message>
<xml_diff>
--- a/project/final_presentation.pptx
+++ b/project/final_presentation.pptx
@@ -13,22 +13,23 @@
     <p:sldMasterId id="2147483849" r:id="rId9"/>
   </p:sldMasterIdLst>
   <p:notesMasterIdLst>
-    <p:notesMasterId r:id="rId20"/>
+    <p:notesMasterId r:id="rId21"/>
   </p:notesMasterIdLst>
   <p:handoutMasterIdLst>
-    <p:handoutMasterId r:id="rId21"/>
+    <p:handoutMasterId r:id="rId22"/>
   </p:handoutMasterIdLst>
   <p:sldIdLst>
     <p:sldId id="268" r:id="rId10"/>
     <p:sldId id="272" r:id="rId11"/>
     <p:sldId id="285" r:id="rId12"/>
-    <p:sldId id="281" r:id="rId13"/>
-    <p:sldId id="282" r:id="rId14"/>
+    <p:sldId id="282" r:id="rId13"/>
+    <p:sldId id="281" r:id="rId14"/>
     <p:sldId id="284" r:id="rId15"/>
-    <p:sldId id="286" r:id="rId16"/>
-    <p:sldId id="287" r:id="rId17"/>
-    <p:sldId id="288" r:id="rId18"/>
-    <p:sldId id="289" r:id="rId19"/>
+    <p:sldId id="290" r:id="rId16"/>
+    <p:sldId id="286" r:id="rId17"/>
+    <p:sldId id="287" r:id="rId18"/>
+    <p:sldId id="288" r:id="rId19"/>
+    <p:sldId id="289" r:id="rId20"/>
   </p:sldIdLst>
   <p:sldSz cx="12187238" cy="6858000"/>
   <p:notesSz cx="7099300" cy="10234613"/>
@@ -290,7 +291,7 @@
               <a:rPr lang="de-DE" smtClean="0">
                 <a:latin typeface="Arial" panose="020B0604020202020204" pitchFamily="34" charset="0"/>
               </a:rPr>
-              <a:t>19.12.2016</a:t>
+              <a:t>20.12.2016</a:t>
             </a:fld>
             <a:endParaRPr lang="de-DE" dirty="0">
               <a:latin typeface="Arial" panose="020B0604020202020204" pitchFamily="34" charset="0"/>
@@ -469,7 +470,7 @@
             <a:fld id="{BCDB334D-D17F-49C4-91DD-37BB7E818209}" type="datetimeFigureOut">
               <a:rPr lang="de-CH" smtClean="0"/>
               <a:pPr/>
-              <a:t>19.12.2016</a:t>
+              <a:t>20.12.2016</a:t>
             </a:fld>
             <a:endParaRPr lang="de-CH" dirty="0"/>
           </a:p>
@@ -800,7 +801,22 @@
             </a:r>
             <a:r>
               <a:rPr lang="en-GB" baseline="0" dirty="0"/>
-              <a:t> to the presentation of our project.</a:t>
+              <a:t> to the presentation of our final project.</a:t>
+            </a:r>
+            <a:br>
+              <a:rPr lang="en-GB" baseline="0" dirty="0"/>
+            </a:br>
+            <a:r>
+              <a:rPr lang="en-GB" baseline="0" dirty="0"/>
+              <a:t>As we already have presented the mid-project milestone presentation, our goal was to create a simple </a:t>
+            </a:r>
+            <a:r>
+              <a:rPr lang="en-GB" baseline="0" dirty="0" err="1"/>
+              <a:t>rollercoast</a:t>
+            </a:r>
+            <a:r>
+              <a:rPr lang="en-GB" baseline="0" dirty="0"/>
+              <a:t> that ends in pool filled with small balls.</a:t>
             </a:r>
             <a:endParaRPr lang="en-GB" dirty="0"/>
           </a:p>
@@ -889,17 +905,34 @@
           <a:p>
             <a:r>
               <a:rPr lang="en-GB" dirty="0"/>
+              <a:t>Here</a:t>
+            </a:r>
+            <a:r>
+              <a:rPr lang="en-GB" baseline="0" dirty="0"/>
+              <a:t> is the overall result of our simulation.</a:t>
+            </a:r>
+            <a:br>
+              <a:rPr lang="en-GB" baseline="0" dirty="0"/>
+            </a:br>
+            <a:r>
+              <a:rPr lang="en-GB" baseline="0" dirty="0"/>
+              <a:t>The box is 10 times heavier than each sphere.</a:t>
+            </a:r>
+          </a:p>
+          <a:p>
+            <a:r>
+              <a:rPr lang="en-GB" baseline="0" dirty="0"/>
+              <a:t>(</a:t>
+            </a:r>
+            <a:r>
+              <a:rPr lang="en-GB" dirty="0"/>
               <a:t>Weight</a:t>
             </a:r>
             <a:r>
               <a:rPr lang="en-GB" baseline="0" dirty="0"/>
-              <a:t> of </a:t>
-            </a:r>
-            <a:r>
-              <a:rPr lang="en-GB" baseline="0"/>
-              <a:t>the spheres: 1</a:t>
-            </a:r>
-            <a:endParaRPr lang="en-GB"/>
+              <a:t> of the spheres: 10)</a:t>
+            </a:r>
+            <a:endParaRPr lang="en-GB" dirty="0"/>
           </a:p>
         </p:txBody>
       </p:sp>
@@ -922,6 +955,110 @@
               <a:rPr lang="de-CH" smtClean="0"/>
               <a:pPr/>
               <a:t>10</a:t>
+            </a:fld>
+            <a:endParaRPr lang="de-CH" dirty="0"/>
+          </a:p>
+        </p:txBody>
+      </p:sp>
+    </p:spTree>
+    <p:extLst>
+      <p:ext uri="{BB962C8B-B14F-4D97-AF65-F5344CB8AC3E}">
+        <p14:creationId xmlns:p14="http://schemas.microsoft.com/office/powerpoint/2010/main" val="4177258231"/>
+      </p:ext>
+    </p:extLst>
+  </p:cSld>
+  <p:clrMapOvr>
+    <a:masterClrMapping/>
+  </p:clrMapOvr>
+</p:notes>
+</file>
+
+<file path=ppt/notesSlides/notesSlide11.xml><?xml version="1.0" encoding="utf-8"?>
+<p:notes xmlns:a="http://schemas.openxmlformats.org/drawingml/2006/main" xmlns:r="http://schemas.openxmlformats.org/officeDocument/2006/relationships" xmlns:p="http://schemas.openxmlformats.org/presentationml/2006/main">
+  <p:cSld>
+    <p:spTree>
+      <p:nvGrpSpPr>
+        <p:cNvPr id="1" name=""/>
+        <p:cNvGrpSpPr/>
+        <p:nvPr/>
+      </p:nvGrpSpPr>
+      <p:grpSpPr>
+        <a:xfrm>
+          <a:off x="0" y="0"/>
+          <a:ext cx="0" cy="0"/>
+          <a:chOff x="0" y="0"/>
+          <a:chExt cx="0" cy="0"/>
+        </a:xfrm>
+      </p:grpSpPr>
+      <p:sp>
+        <p:nvSpPr>
+          <p:cNvPr id="2" name="Folienbildplatzhalter 1"/>
+          <p:cNvSpPr>
+            <a:spLocks noGrp="1" noRot="1" noChangeAspect="1"/>
+          </p:cNvSpPr>
+          <p:nvPr>
+            <p:ph type="sldImg"/>
+          </p:nvPr>
+        </p:nvSpPr>
+        <p:spPr/>
+      </p:sp>
+      <p:sp>
+        <p:nvSpPr>
+          <p:cNvPr id="3" name="Notizenplatzhalter 2"/>
+          <p:cNvSpPr>
+            <a:spLocks noGrp="1"/>
+          </p:cNvSpPr>
+          <p:nvPr>
+            <p:ph type="body" idx="1"/>
+          </p:nvPr>
+        </p:nvSpPr>
+        <p:spPr/>
+        <p:txBody>
+          <a:bodyPr/>
+          <a:lstStyle/>
+          <a:p>
+            <a:r>
+              <a:rPr lang="en-GB" dirty="0"/>
+              <a:t>If we decrease the weight of</a:t>
+            </a:r>
+            <a:r>
+              <a:rPr lang="en-GB" baseline="0" dirty="0"/>
+              <a:t> the spheres, so that the box is a 100 times heavier than a sphere, we get this result.</a:t>
+            </a:r>
+            <a:endParaRPr lang="en-GB" dirty="0"/>
+          </a:p>
+          <a:p>
+            <a:r>
+              <a:rPr lang="en-GB" dirty="0"/>
+              <a:t>(Weight</a:t>
+            </a:r>
+            <a:r>
+              <a:rPr lang="en-GB" baseline="0" dirty="0"/>
+              <a:t> of the spheres: 1)</a:t>
+            </a:r>
+            <a:endParaRPr lang="en-GB" dirty="0"/>
+          </a:p>
+        </p:txBody>
+      </p:sp>
+      <p:sp>
+        <p:nvSpPr>
+          <p:cNvPr id="4" name="Foliennummernplatzhalter 3"/>
+          <p:cNvSpPr>
+            <a:spLocks noGrp="1"/>
+          </p:cNvSpPr>
+          <p:nvPr>
+            <p:ph type="sldNum" sz="quarter" idx="10"/>
+          </p:nvPr>
+        </p:nvSpPr>
+        <p:spPr/>
+        <p:txBody>
+          <a:bodyPr/>
+          <a:lstStyle/>
+          <a:p>
+            <a:fld id="{A51C0C35-A9A2-4EFD-9BAF-1E52E29E03D1}" type="slidenum">
+              <a:rPr lang="de-CH" smtClean="0"/>
+              <a:pPr/>
+              <a:t>11</a:t>
             </a:fld>
             <a:endParaRPr lang="de-CH" dirty="0"/>
           </a:p>
@@ -984,6 +1121,34 @@
           <a:bodyPr/>
           <a:lstStyle/>
           <a:p>
+            <a:pPr marL="0" marR="0" lvl="0" indent="0" algn="l" defTabSz="914400" rtl="0" eaLnBrk="1" fontAlgn="auto" latinLnBrk="0" hangingPunct="1">
+              <a:lnSpc>
+                <a:spcPct val="100000"/>
+              </a:lnSpc>
+              <a:spcBef>
+                <a:spcPts val="0"/>
+              </a:spcBef>
+              <a:spcAft>
+                <a:spcPts val="0"/>
+              </a:spcAft>
+              <a:buClrTx/>
+              <a:buSzTx/>
+              <a:buFontTx/>
+              <a:buNone/>
+              <a:tabLst/>
+              <a:defRPr/>
+            </a:pPr>
+            <a:r>
+              <a:rPr lang="en-GB" dirty="0"/>
+              <a:t>We</a:t>
+            </a:r>
+            <a:r>
+              <a:rPr lang="en-GB" baseline="0" dirty="0"/>
+              <a:t> decided to simplify this scene in the following way: We modelled a very simple slide instead of a complex rollercoaster. Furthermore, we represented the cart of the rollercoaster as a simple box in order to simplify the collision detection of the cart and the balls.</a:t>
+            </a:r>
+            <a:endParaRPr lang="en-GB" dirty="0"/>
+          </a:p>
+          <a:p>
             <a:endParaRPr lang="en-GB" dirty="0"/>
           </a:p>
         </p:txBody>
@@ -1069,6 +1234,40 @@
           <a:bodyPr/>
           <a:lstStyle/>
           <a:p>
+            <a:pPr marL="0" marR="0" lvl="0" indent="0" algn="l" defTabSz="914400" rtl="0" eaLnBrk="1" fontAlgn="auto" latinLnBrk="0" hangingPunct="1">
+              <a:lnSpc>
+                <a:spcPct val="100000"/>
+              </a:lnSpc>
+              <a:spcBef>
+                <a:spcPts val="0"/>
+              </a:spcBef>
+              <a:spcAft>
+                <a:spcPts val="0"/>
+              </a:spcAft>
+              <a:buClrTx/>
+              <a:buSzTx/>
+              <a:buFontTx/>
+              <a:buNone/>
+              <a:tabLst/>
+              <a:defRPr/>
+            </a:pPr>
+            <a:r>
+              <a:rPr lang="en-GB" dirty="0"/>
+              <a:t>Apart from many small problems,</a:t>
+            </a:r>
+            <a:r>
+              <a:rPr lang="en-GB" baseline="0" dirty="0"/>
+              <a:t> we faced two main challenges. </a:t>
+            </a:r>
+            <a:br>
+              <a:rPr lang="en-GB" baseline="0" dirty="0"/>
+            </a:br>
+            <a:r>
+              <a:rPr lang="en-GB" baseline="0" dirty="0"/>
+              <a:t>The first one was the box around the balls and the second one was the stacking of the balls. </a:t>
+            </a:r>
+          </a:p>
+          <a:p>
             <a:endParaRPr lang="en-GB" dirty="0"/>
           </a:p>
         </p:txBody>
@@ -1154,6 +1353,37 @@
           <a:bodyPr/>
           <a:lstStyle/>
           <a:p>
+            <a:pPr marL="0" marR="0" lvl="0" indent="0" algn="l" defTabSz="914400" rtl="0" eaLnBrk="1" fontAlgn="auto" latinLnBrk="0" hangingPunct="1">
+              <a:lnSpc>
+                <a:spcPct val="100000"/>
+              </a:lnSpc>
+              <a:spcBef>
+                <a:spcPts val="0"/>
+              </a:spcBef>
+              <a:spcAft>
+                <a:spcPts val="0"/>
+              </a:spcAft>
+              <a:buClrTx/>
+              <a:buSzTx/>
+              <a:buFontTx/>
+              <a:buNone/>
+              <a:tabLst/>
+              <a:defRPr/>
+            </a:pPr>
+            <a:r>
+              <a:rPr lang="en-GB" dirty="0"/>
+              <a:t>Let’s look at the first problem, the box around the balls.</a:t>
+            </a:r>
+            <a:br>
+              <a:rPr lang="en-GB" dirty="0"/>
+            </a:br>
+            <a:r>
+              <a:rPr lang="en-GB" baseline="0" dirty="0"/>
+              <a:t>For distributing the balls in the box, we decided to create a mesh with the balls above the box and let them fall from a low height into the box. Unfortunately, the balls showed a very strange behaviour inside the box.</a:t>
+            </a:r>
+            <a:endParaRPr lang="en-GB" dirty="0"/>
+          </a:p>
+          <a:p>
             <a:endParaRPr lang="en-GB" dirty="0"/>
           </a:p>
         </p:txBody>
@@ -1185,7 +1415,7 @@
     </p:spTree>
     <p:extLst>
       <p:ext uri="{BB962C8B-B14F-4D97-AF65-F5344CB8AC3E}">
-        <p14:creationId xmlns:p14="http://schemas.microsoft.com/office/powerpoint/2010/main" val="414287202"/>
+        <p14:creationId xmlns:p14="http://schemas.microsoft.com/office/powerpoint/2010/main" val="3394033019"/>
       </p:ext>
     </p:extLst>
   </p:cSld>
@@ -1239,6 +1469,42 @@
           <a:bodyPr/>
           <a:lstStyle/>
           <a:p>
+            <a:pPr marL="0" marR="0" lvl="0" indent="0" algn="l" defTabSz="914400" rtl="0" eaLnBrk="1" fontAlgn="auto" latinLnBrk="0" hangingPunct="1">
+              <a:lnSpc>
+                <a:spcPct val="100000"/>
+              </a:lnSpc>
+              <a:spcBef>
+                <a:spcPts val="0"/>
+              </a:spcBef>
+              <a:spcAft>
+                <a:spcPts val="0"/>
+              </a:spcAft>
+              <a:buClrTx/>
+              <a:buSzTx/>
+              <a:buFontTx/>
+              <a:buNone/>
+              <a:tabLst/>
+              <a:defRPr/>
+            </a:pPr>
+            <a:r>
+              <a:rPr lang="en-GB" dirty="0"/>
+              <a:t>We guess that the problem might be the algorithm,</a:t>
+            </a:r>
+            <a:r>
+              <a:rPr lang="en-GB" baseline="0" dirty="0"/>
+              <a:t> which we used for the collision detection. We implemented the Gilbert-Johnson-</a:t>
+            </a:r>
+            <a:r>
+              <a:rPr lang="en-GB" baseline="0" dirty="0" err="1"/>
+              <a:t>Keerthi</a:t>
+            </a:r>
+            <a:r>
+              <a:rPr lang="en-GB" baseline="0" dirty="0"/>
+              <a:t> algorithm for the collision detection. However, this algorithm only considers convex objects and the inside of the box is clearly not convex.</a:t>
+            </a:r>
+            <a:endParaRPr lang="en-GB" dirty="0"/>
+          </a:p>
+          <a:p>
             <a:endParaRPr lang="en-GB" dirty="0"/>
           </a:p>
         </p:txBody>
@@ -1270,7 +1536,7 @@
     </p:spTree>
     <p:extLst>
       <p:ext uri="{BB962C8B-B14F-4D97-AF65-F5344CB8AC3E}">
-        <p14:creationId xmlns:p14="http://schemas.microsoft.com/office/powerpoint/2010/main" val="3394033019"/>
+        <p14:creationId xmlns:p14="http://schemas.microsoft.com/office/powerpoint/2010/main" val="414287202"/>
       </p:ext>
     </p:extLst>
   </p:cSld>
@@ -1323,6 +1589,42 @@
         <p:txBody>
           <a:bodyPr/>
           <a:lstStyle/>
+          <a:p>
+            <a:pPr marL="0" marR="0" lvl="0" indent="0" algn="l" defTabSz="914400" rtl="0" eaLnBrk="1" fontAlgn="auto" latinLnBrk="0" hangingPunct="1">
+              <a:lnSpc>
+                <a:spcPct val="100000"/>
+              </a:lnSpc>
+              <a:spcBef>
+                <a:spcPts val="0"/>
+              </a:spcBef>
+              <a:spcAft>
+                <a:spcPts val="0"/>
+              </a:spcAft>
+              <a:buClrTx/>
+              <a:buSzTx/>
+              <a:buFontTx/>
+              <a:buNone/>
+              <a:tabLst/>
+              <a:defRPr/>
+            </a:pPr>
+            <a:r>
+              <a:rPr lang="en-GB" dirty="0"/>
+              <a:t>In</a:t>
+            </a:r>
+            <a:r>
+              <a:rPr lang="en-GB" baseline="0" dirty="0"/>
+              <a:t> order to solve this issue, we decided to simply remove the box, because</a:t>
+            </a:r>
+            <a:r>
+              <a:rPr lang="en-GB" dirty="0"/>
+              <a:t> we</a:t>
+            </a:r>
+            <a:r>
+              <a:rPr lang="en-GB" baseline="0" dirty="0"/>
+              <a:t> did not have the time to implement a more sophisticated algorithm for the collision detection, which also considers concave objects,</a:t>
+            </a:r>
+            <a:endParaRPr lang="en-GB" dirty="0"/>
+          </a:p>
           <a:p>
             <a:endParaRPr lang="en-GB" dirty="0"/>
           </a:p>
@@ -1409,6 +1711,33 @@
           <a:bodyPr/>
           <a:lstStyle/>
           <a:p>
+            <a:pPr marL="0" marR="0" lvl="0" indent="0" algn="l" defTabSz="914400" rtl="0" eaLnBrk="1" fontAlgn="auto" latinLnBrk="0" hangingPunct="1">
+              <a:lnSpc>
+                <a:spcPct val="100000"/>
+              </a:lnSpc>
+              <a:spcBef>
+                <a:spcPts val="0"/>
+              </a:spcBef>
+              <a:spcAft>
+                <a:spcPts val="0"/>
+              </a:spcAft>
+              <a:buClrTx/>
+              <a:buSzTx/>
+              <a:buFontTx/>
+              <a:buNone/>
+              <a:tabLst/>
+              <a:defRPr/>
+            </a:pPr>
+            <a:r>
+              <a:rPr lang="en-GB" dirty="0"/>
+              <a:t>As already mentioned, another issue</a:t>
+            </a:r>
+            <a:r>
+              <a:rPr lang="en-GB" baseline="0" dirty="0"/>
+              <a:t> was the stacking of the balls.</a:t>
+            </a:r>
+          </a:p>
+          <a:p>
             <a:endParaRPr lang="en-GB" dirty="0"/>
           </a:p>
         </p:txBody>
@@ -1440,7 +1769,7 @@
     </p:spTree>
     <p:extLst>
       <p:ext uri="{BB962C8B-B14F-4D97-AF65-F5344CB8AC3E}">
-        <p14:creationId xmlns:p14="http://schemas.microsoft.com/office/powerpoint/2010/main" val="3571941434"/>
+        <p14:creationId xmlns:p14="http://schemas.microsoft.com/office/powerpoint/2010/main" val="3245016422"/>
       </p:ext>
     </p:extLst>
   </p:cSld>
@@ -1494,6 +1823,34 @@
           <a:bodyPr/>
           <a:lstStyle/>
           <a:p>
+            <a:pPr marL="0" marR="0" lvl="0" indent="0" algn="l" defTabSz="914400" rtl="0" eaLnBrk="1" fontAlgn="auto" latinLnBrk="0" hangingPunct="1">
+              <a:lnSpc>
+                <a:spcPct val="100000"/>
+              </a:lnSpc>
+              <a:spcBef>
+                <a:spcPts val="0"/>
+              </a:spcBef>
+              <a:spcAft>
+                <a:spcPts val="0"/>
+              </a:spcAft>
+              <a:buClrTx/>
+              <a:buSzTx/>
+              <a:buFontTx/>
+              <a:buNone/>
+              <a:tabLst/>
+              <a:defRPr/>
+            </a:pPr>
+            <a:r>
+              <a:rPr lang="en-GB" dirty="0"/>
+              <a:t>We constructed a mesh with the balls.</a:t>
+            </a:r>
+            <a:r>
+              <a:rPr lang="en-GB" baseline="0" dirty="0"/>
+              <a:t> However, some of the balls show sometimes a very strange behaviour, which we were not able to explain.</a:t>
+            </a:r>
+            <a:endParaRPr lang="en-GB" dirty="0"/>
+          </a:p>
+          <a:p>
             <a:endParaRPr lang="en-GB" dirty="0"/>
           </a:p>
         </p:txBody>
@@ -1525,7 +1882,7 @@
     </p:spTree>
     <p:extLst>
       <p:ext uri="{BB962C8B-B14F-4D97-AF65-F5344CB8AC3E}">
-        <p14:creationId xmlns:p14="http://schemas.microsoft.com/office/powerpoint/2010/main" val="1430098738"/>
+        <p14:creationId xmlns:p14="http://schemas.microsoft.com/office/powerpoint/2010/main" val="3571941434"/>
       </p:ext>
     </p:extLst>
   </p:cSld>
@@ -1579,19 +1936,50 @@
           <a:bodyPr/>
           <a:lstStyle/>
           <a:p>
+            <a:pPr marL="0" marR="0" lvl="0" indent="0" algn="l" defTabSz="914400" rtl="0" eaLnBrk="1" fontAlgn="auto" latinLnBrk="0" hangingPunct="1">
+              <a:lnSpc>
+                <a:spcPct val="100000"/>
+              </a:lnSpc>
+              <a:spcBef>
+                <a:spcPts val="0"/>
+              </a:spcBef>
+              <a:spcAft>
+                <a:spcPts val="0"/>
+              </a:spcAft>
+              <a:buClrTx/>
+              <a:buSzTx/>
+              <a:buFontTx/>
+              <a:buNone/>
+              <a:tabLst/>
+              <a:defRPr/>
+            </a:pPr>
             <a:r>
               <a:rPr lang="en-GB" dirty="0"/>
-              <a:t>Weight</a:t>
+              <a:t>Here is </a:t>
             </a:r>
             <a:r>
               <a:rPr lang="en-GB" baseline="0" dirty="0"/>
-              <a:t> of </a:t>
-            </a:r>
-            <a:r>
-              <a:rPr lang="en-GB" baseline="0"/>
-              <a:t>the spheres: 10</a:t>
-            </a:r>
-            <a:endParaRPr lang="en-GB"/>
+              <a:t>a different </a:t>
+            </a:r>
+            <a:r>
+              <a:rPr lang="en-GB" dirty="0"/>
+              <a:t>mesh, which suffers</a:t>
+            </a:r>
+            <a:r>
+              <a:rPr lang="en-GB" baseline="0" dirty="0"/>
+              <a:t> from the same problem, but the effect is not as so strong as before.</a:t>
+            </a:r>
+            <a:br>
+              <a:rPr lang="en-GB" baseline="0" dirty="0"/>
+            </a:br>
+            <a:r>
+              <a:rPr lang="en-GB" baseline="0" dirty="0"/>
+              <a:t>We were not able to solve this issue. Therefore, we selected a mesh, which is not highly influenced of this effect.</a:t>
+            </a:r>
+            <a:endParaRPr lang="en-GB" dirty="0"/>
+          </a:p>
+          <a:p>
+            <a:endParaRPr lang="en-GB" dirty="0"/>
           </a:p>
         </p:txBody>
       </p:sp>
@@ -1622,7 +2010,7 @@
     </p:spTree>
     <p:extLst>
       <p:ext uri="{BB962C8B-B14F-4D97-AF65-F5344CB8AC3E}">
-        <p14:creationId xmlns:p14="http://schemas.microsoft.com/office/powerpoint/2010/main" val="4177258231"/>
+        <p14:creationId xmlns:p14="http://schemas.microsoft.com/office/powerpoint/2010/main" val="1430098738"/>
       </p:ext>
     </p:extLst>
   </p:cSld>
@@ -1788,7 +2176,7 @@
           <a:p>
             <a:fld id="{D88D1D53-7870-4207-82E4-5548E7614F2B}" type="datetime1">
               <a:rPr lang="de-DE" smtClean="0"/>
-              <a:t>19.12.2016</a:t>
+              <a:t>20.12.2016</a:t>
             </a:fld>
             <a:endParaRPr lang="en-GB" dirty="0"/>
           </a:p>
@@ -2084,7 +2472,7 @@
           <a:p>
             <a:fld id="{37DA672E-61C0-4619-9714-41DC6F7833F2}" type="datetime1">
               <a:rPr lang="de-DE" smtClean="0"/>
-              <a:t>19.12.2016</a:t>
+              <a:t>20.12.2016</a:t>
             </a:fld>
             <a:endParaRPr lang="en-GB" dirty="0"/>
           </a:p>
@@ -2422,7 +2810,7 @@
           <a:p>
             <a:fld id="{16757D2B-6704-44F0-9E9C-EDE68E8A5CAC}" type="datetime1">
               <a:rPr lang="de-DE" smtClean="0"/>
-              <a:t>19.12.2016</a:t>
+              <a:t>20.12.2016</a:t>
             </a:fld>
             <a:endParaRPr lang="en-GB" dirty="0"/>
           </a:p>
@@ -2721,7 +3109,7 @@
           <a:p>
             <a:fld id="{DC398466-ADE3-4E59-8991-918941F1FAFA}" type="datetime1">
               <a:rPr lang="de-DE" smtClean="0"/>
-              <a:t>19.12.2016</a:t>
+              <a:t>20.12.2016</a:t>
             </a:fld>
             <a:endParaRPr lang="en-GB" dirty="0"/>
           </a:p>
@@ -3993,7 +4381,7 @@
           <a:p>
             <a:fld id="{9E6C6F55-C39A-4033-B463-49DB39218984}" type="datetime1">
               <a:rPr lang="de-DE" smtClean="0"/>
-              <a:t>19.12.2016</a:t>
+              <a:t>20.12.2016</a:t>
             </a:fld>
             <a:endParaRPr lang="en-GB" dirty="0"/>
           </a:p>
@@ -4403,7 +4791,7 @@
           <a:p>
             <a:fld id="{7EFC1E22-6DC4-49B2-BC5B-0F402F46A130}" type="datetime1">
               <a:rPr lang="de-DE" smtClean="0"/>
-              <a:t>19.12.2016</a:t>
+              <a:t>20.12.2016</a:t>
             </a:fld>
             <a:endParaRPr lang="en-GB" dirty="0"/>
           </a:p>
@@ -4539,7 +4927,7 @@
           <a:p>
             <a:fld id="{1AF956D9-20BA-41A0-B486-53EC723E4D6B}" type="datetime1">
               <a:rPr lang="de-DE" smtClean="0"/>
-              <a:t>19.12.2016</a:t>
+              <a:t>20.12.2016</a:t>
             </a:fld>
             <a:endParaRPr lang="en-GB" dirty="0"/>
           </a:p>
@@ -4672,7 +5060,7 @@
           <a:p>
             <a:fld id="{4F342D39-22CC-4249-A623-6B691B7A0FD1}" type="datetime1">
               <a:rPr lang="de-DE" smtClean="0"/>
-              <a:t>19.12.2016</a:t>
+              <a:t>20.12.2016</a:t>
             </a:fld>
             <a:endParaRPr lang="en-GB" dirty="0"/>
           </a:p>
@@ -4853,7 +5241,7 @@
           <a:p>
             <a:fld id="{C404258A-8178-4B00-9506-DE7B37EC2549}" type="datetime1">
               <a:rPr lang="de-DE" smtClean="0"/>
-              <a:t>19.12.2016</a:t>
+              <a:t>20.12.2016</a:t>
             </a:fld>
             <a:endParaRPr lang="en-GB" dirty="0"/>
           </a:p>
@@ -5107,7 +5495,7 @@
           <a:p>
             <a:fld id="{B5C47479-E4CA-41B6-9AFB-DB9C8D19AB11}" type="datetime1">
               <a:rPr lang="de-DE" smtClean="0"/>
-              <a:t>19.12.2016</a:t>
+              <a:t>20.12.2016</a:t>
             </a:fld>
             <a:endParaRPr lang="en-GB" dirty="0"/>
           </a:p>
@@ -5445,7 +5833,7 @@
           <a:p>
             <a:fld id="{4BA6ADF3-1BCE-4614-B094-442C283D8268}" type="datetime1">
               <a:rPr lang="de-DE" smtClean="0"/>
-              <a:t>19.12.2016</a:t>
+              <a:t>20.12.2016</a:t>
             </a:fld>
             <a:endParaRPr lang="en-GB" dirty="0"/>
           </a:p>
@@ -5748,7 +6136,7 @@
           <a:p>
             <a:fld id="{20E9AA4A-0B6B-47F4-97F7-F5AEC88F7349}" type="datetime1">
               <a:rPr lang="de-DE" smtClean="0"/>
-              <a:t>19.12.2016</a:t>
+              <a:t>20.12.2016</a:t>
             </a:fld>
             <a:endParaRPr lang="en-GB" dirty="0"/>
           </a:p>
@@ -6047,7 +6435,7 @@
           <a:p>
             <a:fld id="{B85FBE81-C2C5-450C-813F-E586D1AE6C31}" type="datetime1">
               <a:rPr lang="de-DE" smtClean="0"/>
-              <a:t>19.12.2016</a:t>
+              <a:t>20.12.2016</a:t>
             </a:fld>
             <a:endParaRPr lang="en-GB" dirty="0"/>
           </a:p>
@@ -7319,7 +7707,7 @@
           <a:p>
             <a:fld id="{DFB0CE3E-46A9-4CE7-9516-A40F38A7679B}" type="datetime1">
               <a:rPr lang="de-DE" smtClean="0"/>
-              <a:t>19.12.2016</a:t>
+              <a:t>20.12.2016</a:t>
             </a:fld>
             <a:endParaRPr lang="en-GB" dirty="0"/>
           </a:p>
@@ -7729,7 +8117,7 @@
           <a:p>
             <a:fld id="{7D099316-A443-4F22-9473-1863FD73BDB7}" type="datetime1">
               <a:rPr lang="de-DE" smtClean="0"/>
-              <a:t>19.12.2016</a:t>
+              <a:t>20.12.2016</a:t>
             </a:fld>
             <a:endParaRPr lang="en-GB" dirty="0"/>
           </a:p>
@@ -7865,7 +8253,7 @@
           <a:p>
             <a:fld id="{19975655-9077-4929-BA54-64BF686BDD80}" type="datetime1">
               <a:rPr lang="de-DE" smtClean="0"/>
-              <a:t>19.12.2016</a:t>
+              <a:t>20.12.2016</a:t>
             </a:fld>
             <a:endParaRPr lang="en-GB" dirty="0"/>
           </a:p>
@@ -7998,7 +8386,7 @@
           <a:p>
             <a:fld id="{EC3A1AA7-6C93-4457-802A-67EBB4CBAE06}" type="datetime1">
               <a:rPr lang="de-DE" smtClean="0"/>
-              <a:t>19.12.2016</a:t>
+              <a:t>20.12.2016</a:t>
             </a:fld>
             <a:endParaRPr lang="en-GB" dirty="0"/>
           </a:p>
@@ -8179,7 +8567,7 @@
           <a:p>
             <a:fld id="{ACD6D6AC-2C78-41B7-A94D-69CE6105DA9F}" type="datetime1">
               <a:rPr lang="de-DE" smtClean="0"/>
-              <a:t>19.12.2016</a:t>
+              <a:t>20.12.2016</a:t>
             </a:fld>
             <a:endParaRPr lang="en-GB" dirty="0"/>
           </a:p>
@@ -8433,7 +8821,7 @@
           <a:p>
             <a:fld id="{CD888701-8781-4249-9631-10FBB313C971}" type="datetime1">
               <a:rPr lang="de-DE" smtClean="0"/>
-              <a:t>19.12.2016</a:t>
+              <a:t>20.12.2016</a:t>
             </a:fld>
             <a:endParaRPr lang="en-GB" dirty="0"/>
           </a:p>
@@ -8771,7 +9159,7 @@
           <a:p>
             <a:fld id="{D9DE1BE9-E1A9-40A1-97D6-3F496B08F063}" type="datetime1">
               <a:rPr lang="de-DE" smtClean="0"/>
-              <a:t>19.12.2016</a:t>
+              <a:t>20.12.2016</a:t>
             </a:fld>
             <a:endParaRPr lang="en-GB" dirty="0"/>
           </a:p>
@@ -9070,7 +9458,7 @@
           <a:p>
             <a:fld id="{0031C8C0-C368-42FB-BD4D-51983EB7F29D}" type="datetime1">
               <a:rPr lang="de-DE" smtClean="0"/>
-              <a:t>19.12.2016</a:t>
+              <a:t>20.12.2016</a:t>
             </a:fld>
             <a:endParaRPr lang="en-GB" dirty="0"/>
           </a:p>
@@ -9374,7 +9762,7 @@
           <a:p>
             <a:fld id="{B08E990F-5689-4C3B-9DBA-88FBF612326C}" type="datetime1">
               <a:rPr lang="de-DE" smtClean="0"/>
-              <a:t>19.12.2016</a:t>
+              <a:t>20.12.2016</a:t>
             </a:fld>
             <a:endParaRPr lang="en-GB" dirty="0"/>
           </a:p>
@@ -10646,7 +11034,7 @@
           <a:p>
             <a:fld id="{37DEF65A-5DB2-42E3-A3FA-D71FFAC2DD3E}" type="datetime1">
               <a:rPr lang="de-DE" smtClean="0"/>
-              <a:t>19.12.2016</a:t>
+              <a:t>20.12.2016</a:t>
             </a:fld>
             <a:endParaRPr lang="en-GB" dirty="0"/>
           </a:p>
@@ -11056,7 +11444,7 @@
           <a:p>
             <a:fld id="{854CE24D-B8E7-4306-B2AC-8C000C4BED21}" type="datetime1">
               <a:rPr lang="de-DE" smtClean="0"/>
-              <a:t>19.12.2016</a:t>
+              <a:t>20.12.2016</a:t>
             </a:fld>
             <a:endParaRPr lang="en-GB" dirty="0"/>
           </a:p>
@@ -11192,7 +11580,7 @@
           <a:p>
             <a:fld id="{21BAEE40-85C7-4791-80CE-396988C820D1}" type="datetime1">
               <a:rPr lang="de-DE" smtClean="0"/>
-              <a:t>19.12.2016</a:t>
+              <a:t>20.12.2016</a:t>
             </a:fld>
             <a:endParaRPr lang="en-GB" dirty="0"/>
           </a:p>
@@ -11325,7 +11713,7 @@
           <a:p>
             <a:fld id="{CB709AFF-1A1F-41FB-A7CE-4D55C2A8BDBD}" type="datetime1">
               <a:rPr lang="de-DE" smtClean="0"/>
-              <a:t>19.12.2016</a:t>
+              <a:t>20.12.2016</a:t>
             </a:fld>
             <a:endParaRPr lang="en-GB" dirty="0"/>
           </a:p>
@@ -11506,7 +11894,7 @@
           <a:p>
             <a:fld id="{435D9003-B42D-4F63-9374-22B70FDE4540}" type="datetime1">
               <a:rPr lang="de-DE" smtClean="0"/>
-              <a:t>19.12.2016</a:t>
+              <a:t>20.12.2016</a:t>
             </a:fld>
             <a:endParaRPr lang="en-GB" dirty="0"/>
           </a:p>
@@ -11760,7 +12148,7 @@
           <a:p>
             <a:fld id="{3FF599E3-C3BB-4391-873B-F02DEF2CBE10}" type="datetime1">
               <a:rPr lang="de-DE" smtClean="0"/>
-              <a:t>19.12.2016</a:t>
+              <a:t>20.12.2016</a:t>
             </a:fld>
             <a:endParaRPr lang="en-GB" dirty="0"/>
           </a:p>
@@ -12098,7 +12486,7 @@
           <a:p>
             <a:fld id="{754D302F-4E62-49B6-9D89-1D5EAF3915F8}" type="datetime1">
               <a:rPr lang="de-DE" smtClean="0"/>
-              <a:t>19.12.2016</a:t>
+              <a:t>20.12.2016</a:t>
             </a:fld>
             <a:endParaRPr lang="en-GB" dirty="0"/>
           </a:p>
@@ -12397,7 +12785,7 @@
           <a:p>
             <a:fld id="{F36AE14C-67C7-4340-9BE4-75125B0ED34F}" type="datetime1">
               <a:rPr lang="de-DE" smtClean="0"/>
-              <a:t>19.12.2016</a:t>
+              <a:t>20.12.2016</a:t>
             </a:fld>
             <a:endParaRPr lang="en-GB" dirty="0"/>
           </a:p>
@@ -14696,7 +15084,7 @@
           <a:p>
             <a:fld id="{34E07245-DA23-433A-ABFF-7CBC8C016C4D}" type="datetime1">
               <a:rPr lang="de-DE" smtClean="0"/>
-              <a:t>19.12.2016</a:t>
+              <a:t>20.12.2016</a:t>
             </a:fld>
             <a:endParaRPr lang="en-GB" dirty="0"/>
           </a:p>
@@ -15106,7 +15494,7 @@
           <a:p>
             <a:fld id="{4E974BCC-FFFD-46DD-8B3B-AF0BD984AC11}" type="datetime1">
               <a:rPr lang="de-DE" smtClean="0"/>
-              <a:t>19.12.2016</a:t>
+              <a:t>20.12.2016</a:t>
             </a:fld>
             <a:endParaRPr lang="en-GB" dirty="0"/>
           </a:p>
@@ -15242,7 +15630,7 @@
           <a:p>
             <a:fld id="{7CCC5F8B-69E1-4E2F-B9DD-AF9024546933}" type="datetime1">
               <a:rPr lang="de-DE" smtClean="0"/>
-              <a:t>19.12.2016</a:t>
+              <a:t>20.12.2016</a:t>
             </a:fld>
             <a:endParaRPr lang="en-GB" dirty="0"/>
           </a:p>
@@ -15375,7 +15763,7 @@
           <a:p>
             <a:fld id="{BD7EF9EF-7221-4E19-8EE5-3B37057E61A3}" type="datetime1">
               <a:rPr lang="de-DE" smtClean="0"/>
-              <a:t>19.12.2016</a:t>
+              <a:t>20.12.2016</a:t>
             </a:fld>
             <a:endParaRPr lang="en-GB" dirty="0"/>
           </a:p>
@@ -15556,7 +15944,7 @@
           <a:p>
             <a:fld id="{11571518-F59A-4B1A-A106-3D08373B15B0}" type="datetime1">
               <a:rPr lang="de-DE" smtClean="0"/>
-              <a:t>19.12.2016</a:t>
+              <a:t>20.12.2016</a:t>
             </a:fld>
             <a:endParaRPr lang="en-GB" dirty="0"/>
           </a:p>
@@ -15810,7 +16198,7 @@
           <a:p>
             <a:fld id="{3F86E0CF-AB42-4291-A591-ECFBDA8D78B8}" type="datetime1">
               <a:rPr lang="de-DE" smtClean="0"/>
-              <a:t>19.12.2016</a:t>
+              <a:t>20.12.2016</a:t>
             </a:fld>
             <a:endParaRPr lang="en-GB" dirty="0"/>
           </a:p>
@@ -16148,7 +16536,7 @@
           <a:p>
             <a:fld id="{1389FF44-E657-422D-873D-139304140E20}" type="datetime1">
               <a:rPr lang="de-DE" smtClean="0"/>
-              <a:t>19.12.2016</a:t>
+              <a:t>20.12.2016</a:t>
             </a:fld>
             <a:endParaRPr lang="en-GB" dirty="0"/>
           </a:p>
@@ -16447,7 +16835,7 @@
           <a:p>
             <a:fld id="{FC15A311-128A-482D-B806-0437F45FA538}" type="datetime1">
               <a:rPr lang="de-DE" smtClean="0"/>
-              <a:t>19.12.2016</a:t>
+              <a:t>20.12.2016</a:t>
             </a:fld>
             <a:endParaRPr lang="en-GB" dirty="0"/>
           </a:p>
@@ -17719,7 +18107,7 @@
           <a:p>
             <a:fld id="{F5B2312B-A258-434F-95FC-A0997179BE88}" type="datetime1">
               <a:rPr lang="de-DE" smtClean="0"/>
-              <a:t>19.12.2016</a:t>
+              <a:t>20.12.2016</a:t>
             </a:fld>
             <a:endParaRPr lang="en-GB" dirty="0"/>
           </a:p>
@@ -17955,7 +18343,7 @@
           <a:p>
             <a:fld id="{44296D1E-FE9A-4D20-BB01-899D75CE2C54}" type="datetime1">
               <a:rPr lang="de-DE" smtClean="0"/>
-              <a:t>19.12.2016</a:t>
+              <a:t>20.12.2016</a:t>
             </a:fld>
             <a:endParaRPr lang="en-GB" dirty="0"/>
           </a:p>
@@ -18365,7 +18753,7 @@
           <a:p>
             <a:fld id="{17F072F2-841D-4651-8B3F-B9E999E0C1EE}" type="datetime1">
               <a:rPr lang="de-DE" smtClean="0"/>
-              <a:t>19.12.2016</a:t>
+              <a:t>20.12.2016</a:t>
             </a:fld>
             <a:endParaRPr lang="en-GB" dirty="0"/>
           </a:p>
@@ -18501,7 +18889,7 @@
           <a:p>
             <a:fld id="{DACFA4AB-AD77-4716-9780-66CDF01B21F4}" type="datetime1">
               <a:rPr lang="de-DE" smtClean="0"/>
-              <a:t>19.12.2016</a:t>
+              <a:t>20.12.2016</a:t>
             </a:fld>
             <a:endParaRPr lang="en-GB" dirty="0"/>
           </a:p>
@@ -18634,7 +19022,7 @@
           <a:p>
             <a:fld id="{47F6AAC9-D630-4319-9220-DCD447BD8173}" type="datetime1">
               <a:rPr lang="de-DE" smtClean="0"/>
-              <a:t>19.12.2016</a:t>
+              <a:t>20.12.2016</a:t>
             </a:fld>
             <a:endParaRPr lang="en-GB" dirty="0"/>
           </a:p>
@@ -18815,7 +19203,7 @@
           <a:p>
             <a:fld id="{173977F1-D021-4F1A-B148-8BDF5F25DBAF}" type="datetime1">
               <a:rPr lang="de-DE" smtClean="0"/>
-              <a:t>19.12.2016</a:t>
+              <a:t>20.12.2016</a:t>
             </a:fld>
             <a:endParaRPr lang="en-GB" dirty="0"/>
           </a:p>
@@ -19069,7 +19457,7 @@
           <a:p>
             <a:fld id="{02B036EF-399F-4B2B-A09E-B68B37ED216D}" type="datetime1">
               <a:rPr lang="de-DE" smtClean="0"/>
-              <a:t>19.12.2016</a:t>
+              <a:t>20.12.2016</a:t>
             </a:fld>
             <a:endParaRPr lang="en-GB" dirty="0"/>
           </a:p>
@@ -19407,7 +19795,7 @@
           <a:p>
             <a:fld id="{F9D9EB90-83A1-4B21-84E3-FD40503E84E2}" type="datetime1">
               <a:rPr lang="de-DE" smtClean="0"/>
-              <a:t>19.12.2016</a:t>
+              <a:t>20.12.2016</a:t>
             </a:fld>
             <a:endParaRPr lang="en-GB" dirty="0"/>
           </a:p>
@@ -19706,7 +20094,7 @@
           <a:p>
             <a:fld id="{7C7F624D-B407-43B2-9660-C2C1320B6A49}" type="datetime1">
               <a:rPr lang="de-DE" smtClean="0"/>
-              <a:t>19.12.2016</a:t>
+              <a:t>20.12.2016</a:t>
             </a:fld>
             <a:endParaRPr lang="en-GB" dirty="0"/>
           </a:p>
@@ -20978,7 +21366,7 @@
           <a:p>
             <a:fld id="{F3CD8BB8-8F20-483E-B92F-CA662F8C7CAE}" type="datetime1">
               <a:rPr lang="de-DE" smtClean="0"/>
-              <a:t>19.12.2016</a:t>
+              <a:t>20.12.2016</a:t>
             </a:fld>
             <a:endParaRPr lang="en-GB" dirty="0"/>
           </a:p>
@@ -21388,7 +21776,7 @@
           <a:p>
             <a:fld id="{E1F03D06-5F80-4BA7-8E79-9C063EE14D90}" type="datetime1">
               <a:rPr lang="de-DE" smtClean="0"/>
-              <a:t>19.12.2016</a:t>
+              <a:t>20.12.2016</a:t>
             </a:fld>
             <a:endParaRPr lang="en-GB" dirty="0"/>
           </a:p>
@@ -21793,7 +22181,7 @@
           <a:p>
             <a:fld id="{4F662C60-1EC8-4AD2-884F-2B94FC715831}" type="datetime1">
               <a:rPr lang="de-DE" smtClean="0"/>
-              <a:t>19.12.2016</a:t>
+              <a:t>20.12.2016</a:t>
             </a:fld>
             <a:endParaRPr lang="en-GB" dirty="0"/>
           </a:p>
@@ -21929,7 +22317,7 @@
           <a:p>
             <a:fld id="{8E15B345-2CEA-40C3-9B28-DDB49AE5220F}" type="datetime1">
               <a:rPr lang="de-DE" smtClean="0"/>
-              <a:t>19.12.2016</a:t>
+              <a:t>20.12.2016</a:t>
             </a:fld>
             <a:endParaRPr lang="en-GB" dirty="0"/>
           </a:p>
@@ -22062,7 +22450,7 @@
           <a:p>
             <a:fld id="{06E514B1-1A14-44A2-9B5F-8D39402D6BDA}" type="datetime1">
               <a:rPr lang="de-DE" smtClean="0"/>
-              <a:t>19.12.2016</a:t>
+              <a:t>20.12.2016</a:t>
             </a:fld>
             <a:endParaRPr lang="en-GB" dirty="0"/>
           </a:p>
@@ -22243,7 +22631,7 @@
           <a:p>
             <a:fld id="{9DC88BB3-3168-4454-B2CD-178305139677}" type="datetime1">
               <a:rPr lang="de-DE" smtClean="0"/>
-              <a:t>19.12.2016</a:t>
+              <a:t>20.12.2016</a:t>
             </a:fld>
             <a:endParaRPr lang="en-GB" dirty="0"/>
           </a:p>
@@ -22497,7 +22885,7 @@
           <a:p>
             <a:fld id="{39078018-4F33-4FF8-8C97-A16423EB6CF3}" type="datetime1">
               <a:rPr lang="de-DE" smtClean="0"/>
-              <a:t>19.12.2016</a:t>
+              <a:t>20.12.2016</a:t>
             </a:fld>
             <a:endParaRPr lang="en-GB" dirty="0"/>
           </a:p>
@@ -22835,7 +23223,7 @@
           <a:p>
             <a:fld id="{B18D5063-055A-4AA4-8062-51E6C9D6E1D3}" type="datetime1">
               <a:rPr lang="de-DE" smtClean="0"/>
-              <a:t>19.12.2016</a:t>
+              <a:t>20.12.2016</a:t>
             </a:fld>
             <a:endParaRPr lang="en-GB" dirty="0"/>
           </a:p>
@@ -23134,7 +23522,7 @@
           <a:p>
             <a:fld id="{3ECEE4D0-BE34-4AA8-AD5A-B6EEFADDFEE5}" type="datetime1">
               <a:rPr lang="de-DE" smtClean="0"/>
-              <a:t>19.12.2016</a:t>
+              <a:t>20.12.2016</a:t>
             </a:fld>
             <a:endParaRPr lang="en-GB" dirty="0"/>
           </a:p>
@@ -24406,7 +24794,7 @@
           <a:p>
             <a:fld id="{8C522B8D-759C-4E30-99D7-05DF10E525C8}" type="datetime1">
               <a:rPr lang="de-DE" smtClean="0"/>
-              <a:t>19.12.2016</a:t>
+              <a:t>20.12.2016</a:t>
             </a:fld>
             <a:endParaRPr lang="en-GB" dirty="0"/>
           </a:p>
@@ -24816,7 +25204,7 @@
           <a:p>
             <a:fld id="{1C453990-A410-4C95-9E13-9AD8EC7FB41B}" type="datetime1">
               <a:rPr lang="de-DE" smtClean="0"/>
-              <a:t>19.12.2016</a:t>
+              <a:t>20.12.2016</a:t>
             </a:fld>
             <a:endParaRPr lang="en-GB" dirty="0"/>
           </a:p>
@@ -24952,7 +25340,7 @@
           <a:p>
             <a:fld id="{B321A0F0-1066-4767-B3C9-12B56B4A6C96}" type="datetime1">
               <a:rPr lang="de-DE" smtClean="0"/>
-              <a:t>19.12.2016</a:t>
+              <a:t>20.12.2016</a:t>
             </a:fld>
             <a:endParaRPr lang="en-GB" dirty="0"/>
           </a:p>
@@ -25080,7 +25468,7 @@
           <a:p>
             <a:fld id="{33759130-499D-4C3F-85BC-7A837A566CBC}" type="datetime1">
               <a:rPr lang="de-DE" smtClean="0"/>
-              <a:t>19.12.2016</a:t>
+              <a:t>20.12.2016</a:t>
             </a:fld>
             <a:endParaRPr lang="en-GB" dirty="0"/>
           </a:p>
@@ -25213,7 +25601,7 @@
           <a:p>
             <a:fld id="{3A30ECF6-9582-4D32-8034-3FCE788992F2}" type="datetime1">
               <a:rPr lang="de-DE" smtClean="0"/>
-              <a:t>19.12.2016</a:t>
+              <a:t>20.12.2016</a:t>
             </a:fld>
             <a:endParaRPr lang="en-GB" dirty="0"/>
           </a:p>
@@ -25394,7 +25782,7 @@
           <a:p>
             <a:fld id="{24DA22FE-1C49-4EE6-8F9A-5CA0699389EB}" type="datetime1">
               <a:rPr lang="de-DE" smtClean="0"/>
-              <a:t>19.12.2016</a:t>
+              <a:t>20.12.2016</a:t>
             </a:fld>
             <a:endParaRPr lang="en-GB" dirty="0"/>
           </a:p>
@@ -25648,7 +26036,7 @@
           <a:p>
             <a:fld id="{3E26D574-CD47-4554-AE76-4725C2052FB0}" type="datetime1">
               <a:rPr lang="de-DE" smtClean="0"/>
-              <a:t>19.12.2016</a:t>
+              <a:t>20.12.2016</a:t>
             </a:fld>
             <a:endParaRPr lang="en-GB" dirty="0"/>
           </a:p>
@@ -25986,7 +26374,7 @@
           <a:p>
             <a:fld id="{C78D8B24-DDD6-4914-88BE-95B3E8083C3D}" type="datetime1">
               <a:rPr lang="de-DE" smtClean="0"/>
-              <a:t>19.12.2016</a:t>
+              <a:t>20.12.2016</a:t>
             </a:fld>
             <a:endParaRPr lang="en-GB" dirty="0"/>
           </a:p>
@@ -26285,7 +26673,7 @@
           <a:p>
             <a:fld id="{98D997FD-4E63-4E37-AB1D-89FA26A6CCAB}" type="datetime1">
               <a:rPr lang="de-DE" smtClean="0"/>
-              <a:t>19.12.2016</a:t>
+              <a:t>20.12.2016</a:t>
             </a:fld>
             <a:endParaRPr lang="en-GB" dirty="0"/>
           </a:p>
@@ -27557,7 +27945,7 @@
           <a:p>
             <a:fld id="{571C7401-B0FB-418E-8711-7232D811ED8A}" type="datetime1">
               <a:rPr lang="de-DE" smtClean="0"/>
-              <a:t>19.12.2016</a:t>
+              <a:t>20.12.2016</a:t>
             </a:fld>
             <a:endParaRPr lang="en-GB" dirty="0"/>
           </a:p>
@@ -27967,7 +28355,7 @@
           <a:p>
             <a:fld id="{7FFFD11E-BD4C-4D81-9B56-EA0A294E5042}" type="datetime1">
               <a:rPr lang="de-DE" smtClean="0"/>
-              <a:t>19.12.2016</a:t>
+              <a:t>20.12.2016</a:t>
             </a:fld>
             <a:endParaRPr lang="en-GB" dirty="0"/>
           </a:p>
@@ -28103,7 +28491,7 @@
           <a:p>
             <a:fld id="{84C29021-96D6-477D-8FF5-9DF846343097}" type="datetime1">
               <a:rPr lang="de-DE" smtClean="0"/>
-              <a:t>19.12.2016</a:t>
+              <a:t>20.12.2016</a:t>
             </a:fld>
             <a:endParaRPr lang="en-GB" dirty="0"/>
           </a:p>
@@ -28236,7 +28624,7 @@
           <a:p>
             <a:fld id="{D1915F97-ADBA-4F67-9C53-3118DEF6A056}" type="datetime1">
               <a:rPr lang="de-DE" smtClean="0"/>
-              <a:t>19.12.2016</a:t>
+              <a:t>20.12.2016</a:t>
             </a:fld>
             <a:endParaRPr lang="en-GB" dirty="0"/>
           </a:p>
@@ -28371,7 +28759,7 @@
           <a:p>
             <a:fld id="{D243DA8D-EBDF-4699-B479-78B49AD3B57D}" type="datetime1">
               <a:rPr lang="de-DE" smtClean="0"/>
-              <a:t>19.12.2016</a:t>
+              <a:t>20.12.2016</a:t>
             </a:fld>
             <a:endParaRPr lang="en-GB" dirty="0"/>
           </a:p>
@@ -28552,7 +28940,7 @@
           <a:p>
             <a:fld id="{5A3CB3BD-201D-4EFC-A2AA-4EB62F81C167}" type="datetime1">
               <a:rPr lang="de-DE" smtClean="0"/>
-              <a:t>19.12.2016</a:t>
+              <a:t>20.12.2016</a:t>
             </a:fld>
             <a:endParaRPr lang="en-GB" dirty="0"/>
           </a:p>
@@ -28730,7 +29118,7 @@
           <a:p>
             <a:fld id="{2E66D250-B8A7-41B8-AA47-F3AC65F9D389}" type="datetime1">
               <a:rPr lang="de-DE" smtClean="0"/>
-              <a:t>19.12.2016</a:t>
+              <a:t>20.12.2016</a:t>
             </a:fld>
             <a:endParaRPr lang="en-GB" dirty="0"/>
           </a:p>
@@ -29568,7 +29956,7 @@
           <a:p>
             <a:fld id="{34DDB7B4-6C7B-4E61-A7D7-D08F20AFAC6B}" type="datetime1">
               <a:rPr lang="de-DE" smtClean="0"/>
-              <a:t>19.12.2016</a:t>
+              <a:t>20.12.2016</a:t>
             </a:fld>
             <a:endParaRPr lang="en-GB" dirty="0"/>
           </a:p>
@@ -31040,7 +31428,7 @@
           <a:p>
             <a:fld id="{AA6896B9-9C05-4B8A-A70F-BB2C8F547C6B}" type="datetime1">
               <a:rPr lang="de-DE" smtClean="0"/>
-              <a:t>19.12.2016</a:t>
+              <a:t>20.12.2016</a:t>
             </a:fld>
             <a:endParaRPr lang="en-GB" dirty="0"/>
           </a:p>
@@ -32527,7 +32915,7 @@
           <a:p>
             <a:fld id="{7F567909-8DCC-4CCA-B78C-013A1AD3AB2E}" type="datetime1">
               <a:rPr lang="de-DE" smtClean="0"/>
-              <a:t>19.12.2016</a:t>
+              <a:t>20.12.2016</a:t>
             </a:fld>
             <a:endParaRPr lang="en-GB" dirty="0"/>
           </a:p>
@@ -34014,7 +34402,7 @@
           <a:p>
             <a:fld id="{692FDF58-B8FA-4E5B-97E2-312A648F94A4}" type="datetime1">
               <a:rPr lang="de-DE" smtClean="0"/>
-              <a:t>19.12.2016</a:t>
+              <a:t>20.12.2016</a:t>
             </a:fld>
             <a:endParaRPr lang="en-GB" dirty="0"/>
           </a:p>
@@ -35501,7 +35889,7 @@
           <a:p>
             <a:fld id="{0E2FD59A-889C-49E1-B11F-A06E2FCD88F8}" type="datetime1">
               <a:rPr lang="de-DE" smtClean="0"/>
-              <a:t>19.12.2016</a:t>
+              <a:t>20.12.2016</a:t>
             </a:fld>
             <a:endParaRPr lang="en-GB" dirty="0"/>
           </a:p>
@@ -36988,7 +37376,7 @@
           <a:p>
             <a:fld id="{6984EC52-26A9-4BFF-A9C5-BB3A3864DA77}" type="datetime1">
               <a:rPr lang="de-DE" smtClean="0"/>
-              <a:t>19.12.2016</a:t>
+              <a:t>20.12.2016</a:t>
             </a:fld>
             <a:endParaRPr lang="en-GB" dirty="0"/>
           </a:p>
@@ -38475,7 +38863,7 @@
           <a:p>
             <a:fld id="{CEF28E23-0477-4B57-A7D2-63B3A33ABEDB}" type="datetime1">
               <a:rPr lang="de-DE" smtClean="0"/>
-              <a:t>19.12.2016</a:t>
+              <a:t>20.12.2016</a:t>
             </a:fld>
             <a:endParaRPr lang="en-GB" dirty="0"/>
           </a:p>
@@ -39962,7 +40350,7 @@
           <a:p>
             <a:fld id="{88260C45-2122-475A-BCD2-6E405C52F6EF}" type="datetime1">
               <a:rPr lang="de-DE" smtClean="0"/>
-              <a:t>19.12.2016</a:t>
+              <a:t>20.12.2016</a:t>
             </a:fld>
             <a:endParaRPr lang="en-GB" dirty="0"/>
           </a:p>
@@ -41449,7 +41837,7 @@
           <a:p>
             <a:fld id="{2B419E12-2E6D-413C-89F8-CD7877324954}" type="datetime1">
               <a:rPr lang="de-DE" smtClean="0"/>
-              <a:t>19.12.2016</a:t>
+              <a:t>20.12.2016</a:t>
             </a:fld>
             <a:endParaRPr lang="en-GB" dirty="0"/>
           </a:p>
@@ -42252,7 +42640,7 @@
           <a:p>
             <a:fld id="{EB04C782-FABA-4839-8055-9BDDA2DD604F}" type="datetime1">
               <a:rPr lang="de-DE" smtClean="0"/>
-              <a:t>19.12.2016</a:t>
+              <a:t>20.12.2016</a:t>
             </a:fld>
             <a:endParaRPr lang="en-GB" dirty="0"/>
           </a:p>
@@ -42408,7 +42796,7 @@
           <a:p>
             <a:fld id="{F5B2312B-A258-434F-95FC-A0997179BE88}" type="datetime1">
               <a:rPr lang="de-DE" smtClean="0"/>
-              <a:t>19.12.2016</a:t>
+              <a:t>20.12.2016</a:t>
             </a:fld>
             <a:endParaRPr lang="en-GB" dirty="0"/>
           </a:p>
@@ -42498,10 +42886,155 @@
           <a:lstStyle/>
           <a:p>
             <a:r>
+              <a:rPr lang="en-GB" dirty="0"/>
+              <a:t>Finalform_weight10.mp4</a:t>
+            </a:r>
+          </a:p>
+        </p:txBody>
+      </p:sp>
+    </p:spTree>
+    <p:extLst>
+      <p:ext uri="{BB962C8B-B14F-4D97-AF65-F5344CB8AC3E}">
+        <p14:creationId xmlns:p14="http://schemas.microsoft.com/office/powerpoint/2010/main" val="1040186831"/>
+      </p:ext>
+    </p:extLst>
+  </p:cSld>
+  <p:clrMapOvr>
+    <a:masterClrMapping/>
+  </p:clrMapOvr>
+  <p:transition>
+    <p:fade/>
+  </p:transition>
+</p:sld>
+</file>
+
+<file path=ppt/slides/slide11.xml><?xml version="1.0" encoding="utf-8"?>
+<p:sld xmlns:a="http://schemas.openxmlformats.org/drawingml/2006/main" xmlns:r="http://schemas.openxmlformats.org/officeDocument/2006/relationships" xmlns:p="http://schemas.openxmlformats.org/presentationml/2006/main">
+  <p:cSld>
+    <p:spTree>
+      <p:nvGrpSpPr>
+        <p:cNvPr id="1" name=""/>
+        <p:cNvGrpSpPr/>
+        <p:nvPr/>
+      </p:nvGrpSpPr>
+      <p:grpSpPr>
+        <a:xfrm>
+          <a:off x="0" y="0"/>
+          <a:ext cx="0" cy="0"/>
+          <a:chOff x="0" y="0"/>
+          <a:chExt cx="0" cy="0"/>
+        </a:xfrm>
+      </p:grpSpPr>
+      <p:sp>
+        <p:nvSpPr>
+          <p:cNvPr id="3" name="Datumsplatzhalter 2"/>
+          <p:cNvSpPr>
+            <a:spLocks noGrp="1"/>
+          </p:cNvSpPr>
+          <p:nvPr>
+            <p:ph type="dt" sz="half" idx="10"/>
+          </p:nvPr>
+        </p:nvSpPr>
+        <p:spPr/>
+        <p:txBody>
+          <a:bodyPr/>
+          <a:lstStyle/>
+          <a:p>
+            <a:fld id="{F5B2312B-A258-434F-95FC-A0997179BE88}" type="datetime1">
+              <a:rPr lang="de-DE" smtClean="0"/>
+              <a:t>20.12.2016</a:t>
+            </a:fld>
+            <a:endParaRPr lang="en-GB" dirty="0"/>
+          </a:p>
+        </p:txBody>
+      </p:sp>
+      <p:sp>
+        <p:nvSpPr>
+          <p:cNvPr id="4" name="Fußzeilenplatzhalter 3"/>
+          <p:cNvSpPr>
+            <a:spLocks noGrp="1"/>
+          </p:cNvSpPr>
+          <p:nvPr>
+            <p:ph type="ftr" sz="quarter" idx="11"/>
+          </p:nvPr>
+        </p:nvSpPr>
+        <p:spPr/>
+        <p:txBody>
+          <a:bodyPr/>
+          <a:lstStyle/>
+          <a:p>
+            <a:r>
+              <a:rPr lang="en-GB"/>
+              <a:t>Yannick Huber, Julia Giger</a:t>
+            </a:r>
+            <a:endParaRPr lang="en-GB" dirty="0"/>
+          </a:p>
+        </p:txBody>
+      </p:sp>
+      <p:sp>
+        <p:nvSpPr>
+          <p:cNvPr id="5" name="Foliennummernplatzhalter 4"/>
+          <p:cNvSpPr>
+            <a:spLocks noGrp="1"/>
+          </p:cNvSpPr>
+          <p:nvPr>
+            <p:ph type="sldNum" sz="quarter" idx="12"/>
+          </p:nvPr>
+        </p:nvSpPr>
+        <p:spPr/>
+        <p:txBody>
+          <a:bodyPr/>
+          <a:lstStyle/>
+          <a:p>
+            <a:fld id="{6C6AE60A-B69C-4790-82F7-3882EDF23186}" type="slidenum">
+              <a:rPr lang="en-GB" smtClean="0"/>
+              <a:t>11</a:t>
+            </a:fld>
+            <a:endParaRPr lang="en-GB" dirty="0"/>
+          </a:p>
+        </p:txBody>
+      </p:sp>
+      <p:sp>
+        <p:nvSpPr>
+          <p:cNvPr id="6" name="Titel 5"/>
+          <p:cNvSpPr>
+            <a:spLocks noGrp="1"/>
+          </p:cNvSpPr>
+          <p:nvPr>
+            <p:ph type="title"/>
+          </p:nvPr>
+        </p:nvSpPr>
+        <p:spPr/>
+        <p:txBody>
+          <a:bodyPr/>
+          <a:lstStyle/>
+          <a:p>
+            <a:r>
+              <a:rPr lang="en-GB" dirty="0"/>
+              <a:t>Result</a:t>
+            </a:r>
+          </a:p>
+        </p:txBody>
+      </p:sp>
+      <p:sp>
+        <p:nvSpPr>
+          <p:cNvPr id="2" name="Inhaltsplatzhalter 1"/>
+          <p:cNvSpPr>
+            <a:spLocks noGrp="1"/>
+          </p:cNvSpPr>
+          <p:nvPr>
+            <p:ph idx="1"/>
+          </p:nvPr>
+        </p:nvSpPr>
+        <p:spPr/>
+        <p:txBody>
+          <a:bodyPr/>
+          <a:lstStyle/>
+          <a:p>
+            <a:r>
               <a:rPr lang="en-GB"/>
               <a:t>Finalform_weight1.mp4</a:t>
             </a:r>
-            <a:endParaRPr lang="en-GB"/>
           </a:p>
         </p:txBody>
       </p:sp>
@@ -42555,7 +43088,7 @@
           <a:p>
             <a:fld id="{8EA7A386-D2DA-4381-9278-D48217652768}" type="datetime1">
               <a:rPr lang="de-DE" smtClean="0"/>
-              <a:t>19.12.2016</a:t>
+              <a:t>20.12.2016</a:t>
             </a:fld>
             <a:endParaRPr lang="en-GB" dirty="0"/>
           </a:p>
@@ -42709,7 +43242,7 @@
           <a:p>
             <a:fld id="{8EA7A386-D2DA-4381-9278-D48217652768}" type="datetime1">
               <a:rPr lang="de-DE" smtClean="0"/>
-              <a:t>19.12.2016</a:t>
+              <a:t>20.12.2016</a:t>
             </a:fld>
             <a:endParaRPr lang="en-GB" dirty="0"/>
           </a:p>
@@ -42801,7 +43334,7 @@
           <a:p>
             <a:r>
               <a:rPr lang="en-GB" dirty="0"/>
-              <a:t>Concave objects</a:t>
+              <a:t>Box</a:t>
             </a:r>
           </a:p>
           <a:p>
@@ -42862,7 +43395,7 @@
           <a:p>
             <a:fld id="{8EA7A386-D2DA-4381-9278-D48217652768}" type="datetime1">
               <a:rPr lang="de-DE" smtClean="0"/>
-              <a:t>19.12.2016</a:t>
+              <a:t>20.12.2016</a:t>
             </a:fld>
             <a:endParaRPr lang="en-GB" dirty="0"/>
           </a:p>
@@ -42932,7 +43465,7 @@
           <a:p>
             <a:r>
               <a:rPr lang="en-GB" dirty="0"/>
-              <a:t>Concave objects</a:t>
+              <a:t>Box</a:t>
             </a:r>
           </a:p>
         </p:txBody>
@@ -42954,27 +43487,7 @@
           <a:p>
             <a:r>
               <a:rPr lang="en-GB" dirty="0"/>
-              <a:t>Used Gilbert-Johnson-</a:t>
-            </a:r>
-            <a:r>
-              <a:rPr lang="en-GB" dirty="0" err="1"/>
-              <a:t>Keerthi</a:t>
-            </a:r>
-            <a:r>
-              <a:rPr lang="en-GB" dirty="0"/>
-              <a:t> algorithm for the collision detection</a:t>
-            </a:r>
-          </a:p>
-          <a:p>
-            <a:r>
-              <a:rPr lang="en-GB" dirty="0"/>
-              <a:t>Only for convex objects</a:t>
-            </a:r>
-          </a:p>
-          <a:p>
-            <a:r>
-              <a:rPr lang="en-GB" dirty="0"/>
-              <a:t>But inside of the box is not convex</a:t>
+              <a:t>Box_problem.mp4</a:t>
             </a:r>
           </a:p>
         </p:txBody>
@@ -42982,7 +43495,7 @@
     </p:spTree>
     <p:extLst>
       <p:ext uri="{BB962C8B-B14F-4D97-AF65-F5344CB8AC3E}">
-        <p14:creationId xmlns:p14="http://schemas.microsoft.com/office/powerpoint/2010/main" val="2296392827"/>
+        <p14:creationId xmlns:p14="http://schemas.microsoft.com/office/powerpoint/2010/main" val="3307930596"/>
       </p:ext>
     </p:extLst>
   </p:cSld>
@@ -43029,7 +43542,7 @@
           <a:p>
             <a:fld id="{8EA7A386-D2DA-4381-9278-D48217652768}" type="datetime1">
               <a:rPr lang="de-DE" smtClean="0"/>
-              <a:t>19.12.2016</a:t>
+              <a:t>20.12.2016</a:t>
             </a:fld>
             <a:endParaRPr lang="en-GB" dirty="0"/>
           </a:p>
@@ -43099,7 +43612,7 @@
           <a:p>
             <a:r>
               <a:rPr lang="en-GB" dirty="0"/>
-              <a:t>Concave objects</a:t>
+              <a:t>Box: Concave objects</a:t>
             </a:r>
           </a:p>
         </p:txBody>
@@ -43121,7 +43634,35 @@
           <a:p>
             <a:r>
               <a:rPr lang="en-GB" dirty="0"/>
-              <a:t>Box_problem.mp4</a:t>
+              <a:t>Gilbert-Johnson-</a:t>
+            </a:r>
+            <a:r>
+              <a:rPr lang="en-GB" dirty="0" err="1"/>
+              <a:t>Keerthi</a:t>
+            </a:r>
+            <a:r>
+              <a:rPr lang="en-GB" dirty="0"/>
+              <a:t> algorithm </a:t>
+            </a:r>
+            <a:r>
+              <a:rPr lang="en-GB" dirty="0" err="1"/>
+              <a:t>forcollision</a:t>
+            </a:r>
+            <a:r>
+              <a:rPr lang="en-GB" dirty="0"/>
+              <a:t> detection</a:t>
+            </a:r>
+          </a:p>
+          <a:p>
+            <a:r>
+              <a:rPr lang="en-GB" dirty="0"/>
+              <a:t>Only for convex objects</a:t>
+            </a:r>
+          </a:p>
+          <a:p>
+            <a:r>
+              <a:rPr lang="en-GB" dirty="0"/>
+              <a:t>Inside of the box: concave</a:t>
             </a:r>
           </a:p>
         </p:txBody>
@@ -43129,7 +43670,7 @@
     </p:spTree>
     <p:extLst>
       <p:ext uri="{BB962C8B-B14F-4D97-AF65-F5344CB8AC3E}">
-        <p14:creationId xmlns:p14="http://schemas.microsoft.com/office/powerpoint/2010/main" val="3307930596"/>
+        <p14:creationId xmlns:p14="http://schemas.microsoft.com/office/powerpoint/2010/main" val="2296392827"/>
       </p:ext>
     </p:extLst>
   </p:cSld>
@@ -43176,7 +43717,7 @@
           <a:p>
             <a:fld id="{8EA7A386-D2DA-4381-9278-D48217652768}" type="datetime1">
               <a:rPr lang="de-DE" smtClean="0"/>
-              <a:t>19.12.2016</a:t>
+              <a:t>20.12.2016</a:t>
             </a:fld>
             <a:endParaRPr lang="en-GB" dirty="0"/>
           </a:p>
@@ -43323,7 +43864,7 @@
           <a:p>
             <a:fld id="{8EA7A386-D2DA-4381-9278-D48217652768}" type="datetime1">
               <a:rPr lang="de-DE" smtClean="0"/>
-              <a:t>19.12.2016</a:t>
+              <a:t>20.12.2016</a:t>
             </a:fld>
             <a:endParaRPr lang="en-GB" dirty="0"/>
           </a:p>
@@ -43393,7 +43934,7 @@
           <a:p>
             <a:r>
               <a:rPr lang="en-GB" dirty="0"/>
-              <a:t>Stacking</a:t>
+              <a:t>Problems</a:t>
             </a:r>
           </a:p>
         </p:txBody>
@@ -43415,7 +43956,13 @@
           <a:p>
             <a:r>
               <a:rPr lang="en-GB" dirty="0"/>
-              <a:t>Stacking.mp4</a:t>
+              <a:t>Box</a:t>
+            </a:r>
+          </a:p>
+          <a:p>
+            <a:r>
+              <a:rPr lang="en-GB" dirty="0"/>
+              <a:t>Stacking</a:t>
             </a:r>
           </a:p>
         </p:txBody>
@@ -43423,7 +43970,7 @@
     </p:spTree>
     <p:extLst>
       <p:ext uri="{BB962C8B-B14F-4D97-AF65-F5344CB8AC3E}">
-        <p14:creationId xmlns:p14="http://schemas.microsoft.com/office/powerpoint/2010/main" val="1450472921"/>
+        <p14:creationId xmlns:p14="http://schemas.microsoft.com/office/powerpoint/2010/main" val="221369824"/>
       </p:ext>
     </p:extLst>
   </p:cSld>
@@ -43470,7 +44017,7 @@
           <a:p>
             <a:fld id="{8EA7A386-D2DA-4381-9278-D48217652768}" type="datetime1">
               <a:rPr lang="de-DE" smtClean="0"/>
-              <a:t>19.12.2016</a:t>
+              <a:t>20.12.2016</a:t>
             </a:fld>
             <a:endParaRPr lang="en-GB" dirty="0"/>
           </a:p>
@@ -43562,7 +44109,7 @@
           <a:p>
             <a:r>
               <a:rPr lang="en-GB" dirty="0"/>
-              <a:t>Stacking2.mp4</a:t>
+              <a:t>Stacking.mp4</a:t>
             </a:r>
           </a:p>
         </p:txBody>
@@ -43570,7 +44117,7 @@
     </p:spTree>
     <p:extLst>
       <p:ext uri="{BB962C8B-B14F-4D97-AF65-F5344CB8AC3E}">
-        <p14:creationId xmlns:p14="http://schemas.microsoft.com/office/powerpoint/2010/main" val="1104005316"/>
+        <p14:creationId xmlns:p14="http://schemas.microsoft.com/office/powerpoint/2010/main" val="1450472921"/>
       </p:ext>
     </p:extLst>
   </p:cSld>
@@ -43615,9 +44162,9 @@
           <a:bodyPr/>
           <a:lstStyle/>
           <a:p>
-            <a:fld id="{F5B2312B-A258-434F-95FC-A0997179BE88}" type="datetime1">
+            <a:fld id="{8EA7A386-D2DA-4381-9278-D48217652768}" type="datetime1">
               <a:rPr lang="de-DE" smtClean="0"/>
-              <a:t>19.12.2016</a:t>
+              <a:t>20.12.2016</a:t>
             </a:fld>
             <a:endParaRPr lang="en-GB" dirty="0"/>
           </a:p>
@@ -43663,6 +44210,7 @@
           <a:p>
             <a:fld id="{6C6AE60A-B69C-4790-82F7-3882EDF23186}" type="slidenum">
               <a:rPr lang="en-GB" smtClean="0"/>
+              <a:pPr/>
               <a:t>9</a:t>
             </a:fld>
             <a:endParaRPr lang="en-GB" dirty="0"/>
@@ -43671,7 +44219,7 @@
       </p:sp>
       <p:sp>
         <p:nvSpPr>
-          <p:cNvPr id="6" name="Titel 5"/>
+          <p:cNvPr id="10" name="Titel 9"/>
           <p:cNvSpPr>
             <a:spLocks noGrp="1"/>
           </p:cNvSpPr>
@@ -43686,7 +44234,7 @@
           <a:p>
             <a:r>
               <a:rPr lang="en-GB" dirty="0"/>
-              <a:t>Result</a:t>
+              <a:t>Stacking</a:t>
             </a:r>
           </a:p>
         </p:txBody>
@@ -43708,7 +44256,7 @@
           <a:p>
             <a:r>
               <a:rPr lang="en-GB" dirty="0"/>
-              <a:t>Finalform_weight10.mp4</a:t>
+              <a:t>Stacking2.mp4</a:t>
             </a:r>
           </a:p>
         </p:txBody>
@@ -43716,7 +44264,7 @@
     </p:spTree>
     <p:extLst>
       <p:ext uri="{BB962C8B-B14F-4D97-AF65-F5344CB8AC3E}">
-        <p14:creationId xmlns:p14="http://schemas.microsoft.com/office/powerpoint/2010/main" val="1040186831"/>
+        <p14:creationId xmlns:p14="http://schemas.microsoft.com/office/powerpoint/2010/main" val="1104005316"/>
       </p:ext>
     </p:extLst>
   </p:cSld>

</xml_diff>